<commit_message>
update 1 file and delete 1 file
</commit_message>
<xml_diff>
--- a/Meeting/MeetingImgs.pptx
+++ b/Meeting/MeetingImgs.pptx
@@ -5025,7 +5025,7 @@
       <p:bgPr>
         <a:solidFill>
           <a:schemeClr val="bg2">
-            <a:lumMod val="50000"/>
+            <a:lumMod val="25000"/>
           </a:schemeClr>
         </a:solidFill>
         <a:effectLst/>
@@ -5119,7 +5119,7 @@
             </a:prstGeom>
             <a:solidFill>
               <a:schemeClr val="bg2">
-                <a:lumMod val="50000"/>
+                <a:lumMod val="25000"/>
               </a:schemeClr>
             </a:solidFill>
           </p:spPr>
@@ -5219,7 +5219,9 @@
               <a:avLst/>
             </a:prstGeom>
             <a:solidFill>
-              <a:schemeClr val="bg1"/>
+              <a:schemeClr val="bg2">
+                <a:lumMod val="25000"/>
+              </a:schemeClr>
             </a:solidFill>
           </p:spPr>
           <p:txBody>
@@ -5229,10 +5231,18 @@
             <a:lstStyle/>
             <a:p>
               <a:r>
-                <a:rPr lang="en-US" sz="4400" b="1" dirty="0"/>
+                <a:rPr lang="en-US" sz="4400" b="1" dirty="0">
+                  <a:solidFill>
+                    <a:schemeClr val="bg1"/>
+                  </a:solidFill>
+                </a:rPr>
                 <a:t>2</a:t>
               </a:r>
-              <a:endParaRPr lang="en-US" b="1" dirty="0"/>
+              <a:endParaRPr lang="en-US" b="1" dirty="0">
+                <a:solidFill>
+                  <a:schemeClr val="bg1"/>
+                </a:solidFill>
+              </a:endParaRPr>
             </a:p>
           </p:txBody>
         </p:sp>
@@ -5310,7 +5320,9 @@
               <a:avLst/>
             </a:prstGeom>
             <a:solidFill>
-              <a:schemeClr val="bg1"/>
+              <a:schemeClr val="bg2">
+                <a:lumMod val="25000"/>
+              </a:schemeClr>
             </a:solidFill>
           </p:spPr>
           <p:txBody>
@@ -5320,10 +5332,18 @@
             <a:lstStyle/>
             <a:p>
               <a:r>
-                <a:rPr lang="en-US" sz="4400" b="1" dirty="0"/>
+                <a:rPr lang="en-US" sz="4400" b="1" dirty="0">
+                  <a:solidFill>
+                    <a:schemeClr val="bg1"/>
+                  </a:solidFill>
+                </a:rPr>
                 <a:t>3</a:t>
               </a:r>
-              <a:endParaRPr lang="en-US" b="1" dirty="0"/>
+              <a:endParaRPr lang="en-US" b="1" dirty="0">
+                <a:solidFill>
+                  <a:schemeClr val="bg1"/>
+                </a:solidFill>
+              </a:endParaRPr>
             </a:p>
           </p:txBody>
         </p:sp>
@@ -5401,7 +5421,9 @@
               <a:avLst/>
             </a:prstGeom>
             <a:solidFill>
-              <a:schemeClr val="bg1"/>
+              <a:schemeClr val="bg2">
+                <a:lumMod val="25000"/>
+              </a:schemeClr>
             </a:solidFill>
           </p:spPr>
           <p:txBody>
@@ -5411,10 +5433,18 @@
             <a:lstStyle/>
             <a:p>
               <a:r>
-                <a:rPr lang="en-US" sz="4400" b="1" dirty="0"/>
+                <a:rPr lang="en-US" sz="4400" b="1" dirty="0">
+                  <a:solidFill>
+                    <a:schemeClr val="bg1"/>
+                  </a:solidFill>
+                </a:rPr>
                 <a:t>4</a:t>
               </a:r>
-              <a:endParaRPr lang="en-US" b="1" dirty="0"/>
+              <a:endParaRPr lang="en-US" b="1" dirty="0">
+                <a:solidFill>
+                  <a:schemeClr val="bg1"/>
+                </a:solidFill>
+              </a:endParaRPr>
             </a:p>
           </p:txBody>
         </p:sp>
@@ -5492,7 +5522,9 @@
               <a:avLst/>
             </a:prstGeom>
             <a:solidFill>
-              <a:schemeClr val="bg1"/>
+              <a:schemeClr val="bg2">
+                <a:lumMod val="25000"/>
+              </a:schemeClr>
             </a:solidFill>
           </p:spPr>
           <p:txBody>
@@ -5502,10 +5534,18 @@
             <a:lstStyle/>
             <a:p>
               <a:r>
-                <a:rPr lang="en-US" sz="4400" b="1" dirty="0"/>
+                <a:rPr lang="en-US" sz="4400" b="1" dirty="0">
+                  <a:solidFill>
+                    <a:schemeClr val="bg1"/>
+                  </a:solidFill>
+                </a:rPr>
                 <a:t>5</a:t>
               </a:r>
-              <a:endParaRPr lang="en-US" b="1" dirty="0"/>
+              <a:endParaRPr lang="en-US" b="1" dirty="0">
+                <a:solidFill>
+                  <a:schemeClr val="bg1"/>
+                </a:solidFill>
+              </a:endParaRPr>
             </a:p>
           </p:txBody>
         </p:sp>
@@ -5583,7 +5623,9 @@
               <a:avLst/>
             </a:prstGeom>
             <a:solidFill>
-              <a:schemeClr val="bg1"/>
+              <a:schemeClr val="bg2">
+                <a:lumMod val="25000"/>
+              </a:schemeClr>
             </a:solidFill>
           </p:spPr>
           <p:txBody>
@@ -5593,10 +5635,18 @@
             <a:lstStyle/>
             <a:p>
               <a:r>
-                <a:rPr lang="en-US" sz="4400" b="1" dirty="0"/>
+                <a:rPr lang="en-US" sz="4400" b="1" dirty="0">
+                  <a:solidFill>
+                    <a:schemeClr val="bg1"/>
+                  </a:solidFill>
+                </a:rPr>
                 <a:t>6</a:t>
               </a:r>
-              <a:endParaRPr lang="en-US" b="1" dirty="0"/>
+              <a:endParaRPr lang="en-US" b="1" dirty="0">
+                <a:solidFill>
+                  <a:schemeClr val="bg1"/>
+                </a:solidFill>
+              </a:endParaRPr>
             </a:p>
           </p:txBody>
         </p:sp>
@@ -5674,7 +5724,9 @@
               <a:avLst/>
             </a:prstGeom>
             <a:solidFill>
-              <a:schemeClr val="bg1"/>
+              <a:schemeClr val="bg2">
+                <a:lumMod val="25000"/>
+              </a:schemeClr>
             </a:solidFill>
           </p:spPr>
           <p:txBody>
@@ -5684,10 +5736,18 @@
             <a:lstStyle/>
             <a:p>
               <a:r>
-                <a:rPr lang="en-US" sz="4400" b="1" dirty="0"/>
+                <a:rPr lang="en-US" sz="4400" b="1" dirty="0">
+                  <a:solidFill>
+                    <a:schemeClr val="bg1"/>
+                  </a:solidFill>
+                </a:rPr>
                 <a:t>7</a:t>
               </a:r>
-              <a:endParaRPr lang="en-US" b="1" dirty="0"/>
+              <a:endParaRPr lang="en-US" b="1" dirty="0">
+                <a:solidFill>
+                  <a:schemeClr val="bg1"/>
+                </a:solidFill>
+              </a:endParaRPr>
             </a:p>
           </p:txBody>
         </p:sp>

</xml_diff>